<commit_message>
wealth index calculation last attempt before mim
</commit_message>
<xml_diff>
--- a/wet_season/ibadan_descriptive.pptx
+++ b/wet_season/ibadan_descriptive.pptx
@@ -3403,8 +3403,8 @@
         </p:blipFill>
         <p:spPr bwMode="auto">
           <a:xfrm>
-            <a:off x="2451100" y="1193800"/>
-            <a:ext cx="4241800" cy="3390900"/>
+            <a:off x="2032000" y="1193800"/>
+            <a:ext cx="5080000" cy="3390900"/>
           </a:xfrm>
           <a:prstGeom prst="rect">
             <a:avLst/>
@@ -3480,8 +3480,8 @@
         </p:blipFill>
         <p:spPr bwMode="auto">
           <a:xfrm>
-            <a:off x="2451100" y="1193800"/>
-            <a:ext cx="4241800" cy="3390900"/>
+            <a:off x="2032000" y="1193800"/>
+            <a:ext cx="5080000" cy="3390900"/>
           </a:xfrm>
           <a:prstGeom prst="rect">
             <a:avLst/>

</xml_diff>